<commit_message>
modified poster with new Lt plot
</commit_message>
<xml_diff>
--- a/slides/Aspen_poster_v3.pptx
+++ b/slides/Aspen_poster_v3.pptx
@@ -6462,7 +6462,7 @@
               <a:graphicData uri="http://schemas.openxmlformats.org/presentationml/2006/ole">
                 <mc:AlternateContent xmlns:mc="http://schemas.openxmlformats.org/markup-compatibility/2006">
                   <mc:Choice xmlns:v="urn:schemas-microsoft-com:vml" Requires="v">
-                    <p:oleObj spid="_x0000_s1550" name="Equation" r:id="rId4" imgW="1879600" imgH="1282700" progId="Equation.3">
+                    <p:oleObj spid="_x0000_s1556" name="Equation" r:id="rId4" imgW="1879600" imgH="1282700" progId="Equation.3">
                       <p:embed/>
                     </p:oleObj>
                   </mc:Choice>
@@ -7267,7 +7267,7 @@
           <a:graphicData uri="http://schemas.openxmlformats.org/presentationml/2006/ole">
             <mc:AlternateContent xmlns:mc="http://schemas.openxmlformats.org/markup-compatibility/2006">
               <mc:Choice xmlns:v="urn:schemas-microsoft-com:vml" Requires="v">
-                <p:oleObj spid="_x0000_s1551" name="Equation" r:id="rId6" imgW="1485900" imgH="317500" progId="Equation.3">
+                <p:oleObj spid="_x0000_s1557" name="Equation" r:id="rId6" imgW="1485900" imgH="317500" progId="Equation.3">
                   <p:embed/>
                 </p:oleObj>
               </mc:Choice>
@@ -7758,41 +7758,6 @@
           </a:p>
         </p:txBody>
       </p:sp>
-      <p:pic>
-        <p:nvPicPr>
-          <p:cNvPr id="20" name="Picture 19" descr="Mcrit_vs_a_3Myrs.pdf"/>
-          <p:cNvPicPr>
-            <a:picLocks noChangeAspect="1"/>
-          </p:cNvPicPr>
-          <p:nvPr/>
-        </p:nvPicPr>
-        <p:blipFill>
-          <a:blip r:embed="rId8">
-            <a:extLst>
-              <a:ext uri="{28A0092B-C50C-407E-A947-70E740481C1C}">
-                <a14:useLocalDpi xmlns:a14="http://schemas.microsoft.com/office/drawing/2010/main" val="0"/>
-              </a:ext>
-            </a:extLst>
-          </a:blip>
-          <a:stretch>
-            <a:fillRect/>
-          </a:stretch>
-        </p:blipFill>
-        <p:spPr>
-          <a:xfrm>
-            <a:off x="15594806" y="31079280"/>
-            <a:ext cx="12725400" cy="5414533"/>
-          </a:xfrm>
-          <a:prstGeom prst="rect">
-            <a:avLst/>
-          </a:prstGeom>
-          <a:ln w="63500">
-            <a:solidFill>
-              <a:srgbClr val="0000FF"/>
-            </a:solidFill>
-          </a:ln>
-        </p:spPr>
-      </p:pic>
       <p:sp>
         <p:nvSpPr>
           <p:cNvPr id="21" name="Rounded Rectangle 20"/>
@@ -8692,12 +8657,12 @@
           <a:graphicData uri="http://schemas.openxmlformats.org/presentationml/2006/ole">
             <mc:AlternateContent xmlns:mc="http://schemas.openxmlformats.org/markup-compatibility/2006">
               <mc:Choice xmlns:v="urn:schemas-microsoft-com:vml" Requires="v">
-                <p:oleObj spid="_x0000_s1552" name="Equation" r:id="rId9" imgW="1778000" imgH="177800" progId="Equation.3">
+                <p:oleObj spid="_x0000_s1558" name="Equation" r:id="rId8" imgW="1778000" imgH="177800" progId="Equation.3">
                   <p:embed/>
                 </p:oleObj>
               </mc:Choice>
               <mc:Fallback>
-                <p:oleObj name="Equation" r:id="rId9" imgW="1778000" imgH="177800" progId="Equation.3">
+                <p:oleObj name="Equation" r:id="rId8" imgW="1778000" imgH="177800" progId="Equation.3">
                   <p:embed/>
                   <p:pic>
                     <p:nvPicPr>
@@ -8708,7 +8673,7 @@
                       <p:nvPr/>
                     </p:nvPicPr>
                     <p:blipFill>
-                      <a:blip r:embed="rId10"/>
+                      <a:blip r:embed="rId9"/>
                       <a:srcRect/>
                       <a:stretch>
                         <a:fillRect/>
@@ -8923,42 +8888,18 @@
                   <a:srgbClr val="FFFFFF"/>
                 </a:solidFill>
               </a:rPr>
-              <a:t>. In this case, </a:t>
-            </a:r>
-            <a:r>
-              <a:rPr lang="en-US" sz="2400" smtClean="0">
+              <a:t>. In this case, runaway gas accretion is initiated after </a:t>
+            </a:r>
+            <a:r>
+              <a:rPr lang="en-US" sz="2400" i="1" dirty="0" smtClean="0">
                 <a:solidFill>
                   <a:srgbClr val="FFFFFF"/>
                 </a:solidFill>
               </a:rPr>
-              <a:t>runaway gas </a:t>
+              <a:t>T~</a:t>
             </a:r>
             <a:r>
               <a:rPr lang="en-US" sz="2400" dirty="0" smtClean="0">
-                <a:solidFill>
-                  <a:srgbClr val="FFFFFF"/>
-                </a:solidFill>
-              </a:rPr>
-              <a:t>accretion is initiated </a:t>
-            </a:r>
-            <a:r>
-              <a:rPr lang="en-US" sz="2400" smtClean="0">
-                <a:solidFill>
-                  <a:srgbClr val="FFFFFF"/>
-                </a:solidFill>
-              </a:rPr>
-              <a:t>after </a:t>
-            </a:r>
-            <a:r>
-              <a:rPr lang="en-US" sz="2400" i="1" smtClean="0">
-                <a:solidFill>
-                  <a:srgbClr val="FFFFFF"/>
-                </a:solidFill>
-              </a:rPr>
-              <a:t>T~</a:t>
-            </a:r>
-            <a:r>
-              <a:rPr lang="en-US" sz="2400" smtClean="0">
                 <a:solidFill>
                   <a:srgbClr val="FFFFFF"/>
                 </a:solidFill>
@@ -9400,7 +9341,7 @@
           <p:nvPr/>
         </p:nvPicPr>
         <p:blipFill>
-          <a:blip r:embed="rId11">
+          <a:blip r:embed="rId10">
             <a:extLst>
               <a:ext uri="{28A0092B-C50C-407E-A947-70E740481C1C}">
                 <a14:useLocalDpi xmlns:a14="http://schemas.microsoft.com/office/drawing/2010/main" val="0"/>
@@ -9430,11 +9371,11 @@
           <p:nvPr/>
         </p:nvPicPr>
         <p:blipFill>
-          <a:blip r:embed="rId12">
+          <a:blip r:embed="rId11">
             <a:extLst>
               <a:ext uri="{BEBA8EAE-BF5A-486C-A8C5-ECC9F3942E4B}">
                 <a14:imgProps xmlns:a14="http://schemas.microsoft.com/office/drawing/2010/main">
-                  <a14:imgLayer r:embed="rId13">
+                  <a14:imgLayer r:embed="rId12">
                     <a14:imgEffect>
                       <a14:backgroundRemoval t="10000" b="90000" l="10000" r="90000"/>
                     </a14:imgEffect>
@@ -9525,11 +9466,11 @@
             <p:nvPr/>
           </p:nvPicPr>
           <p:blipFill rotWithShape="1">
-            <a:blip r:embed="rId14">
+            <a:blip r:embed="rId13">
               <a:extLst>
                 <a:ext uri="{BEBA8EAE-BF5A-486C-A8C5-ECC9F3942E4B}">
                   <a14:imgProps xmlns:a14="http://schemas.microsoft.com/office/drawing/2010/main">
-                    <a14:imgLayer r:embed="rId15">
+                    <a14:imgLayer r:embed="rId14">
                       <a14:imgEffect>
                         <a14:backgroundRemoval t="0" b="98551" l="10000" r="90000">
                           <a14:foregroundMark x1="36667" y1="19807" x2="36667" y2="19807"/>
@@ -9577,7 +9518,7 @@
           <p:nvPr/>
         </p:nvPicPr>
         <p:blipFill>
-          <a:blip r:embed="rId16">
+          <a:blip r:embed="rId15">
             <a:extLst>
               <a:ext uri="{28A0092B-C50C-407E-A947-70E740481C1C}">
                 <a14:useLocalDpi xmlns:a14="http://schemas.microsoft.com/office/drawing/2010/main" val="0"/>
@@ -9605,41 +9546,6 @@
       </p:pic>
       <p:pic>
         <p:nvPicPr>
-          <p:cNvPr id="10" name="Picture 9" descr="Lt_profiles.pdf"/>
-          <p:cNvPicPr>
-            <a:picLocks noChangeAspect="1"/>
-          </p:cNvPicPr>
-          <p:nvPr/>
-        </p:nvPicPr>
-        <p:blipFill>
-          <a:blip r:embed="rId17">
-            <a:extLst>
-              <a:ext uri="{28A0092B-C50C-407E-A947-70E740481C1C}">
-                <a14:useLocalDpi xmlns:a14="http://schemas.microsoft.com/office/drawing/2010/main" val="0"/>
-              </a:ext>
-            </a:extLst>
-          </a:blip>
-          <a:stretch>
-            <a:fillRect/>
-          </a:stretch>
-        </p:blipFill>
-        <p:spPr>
-          <a:xfrm>
-            <a:off x="2107406" y="30774480"/>
-            <a:ext cx="11963400" cy="6441831"/>
-          </a:xfrm>
-          <a:prstGeom prst="rect">
-            <a:avLst/>
-          </a:prstGeom>
-          <a:ln w="63500">
-            <a:solidFill>
-              <a:srgbClr val="0000FF"/>
-            </a:solidFill>
-          </a:ln>
-        </p:spPr>
-      </p:pic>
-      <p:pic>
-        <p:nvPicPr>
           <p:cNvPr id="11" name="Picture 10" descr="cumul_coolingtime_vs_Matm_10au_mu235.pdf"/>
           <p:cNvPicPr>
             <a:picLocks noChangeAspect="1"/>
@@ -9647,7 +9553,7 @@
           <p:nvPr/>
         </p:nvPicPr>
         <p:blipFill>
-          <a:blip r:embed="rId18">
+          <a:blip r:embed="rId16">
             <a:extLst>
               <a:ext uri="{28A0092B-C50C-407E-A947-70E740481C1C}">
                 <a14:useLocalDpi xmlns:a14="http://schemas.microsoft.com/office/drawing/2010/main" val="0"/>
@@ -9682,7 +9588,7 @@
           <p:nvPr/>
         </p:nvPicPr>
         <p:blipFill>
-          <a:blip r:embed="rId19">
+          <a:blip r:embed="rId17">
             <a:extLst>
               <a:ext uri="{28A0092B-C50C-407E-A947-70E740481C1C}">
                 <a14:useLocalDpi xmlns:a14="http://schemas.microsoft.com/office/drawing/2010/main" val="0"/>
@@ -9712,7 +9618,7 @@
           <p:nvPr/>
         </p:nvPicPr>
         <p:blipFill>
-          <a:blip r:embed="rId20">
+          <a:blip r:embed="rId18">
             <a:extLst>
               <a:ext uri="{28A0092B-C50C-407E-A947-70E740481C1C}">
                 <a14:useLocalDpi xmlns:a14="http://schemas.microsoft.com/office/drawing/2010/main" val="0"/>
@@ -9727,6 +9633,76 @@
           <a:xfrm>
             <a:off x="15442406" y="9286081"/>
             <a:ext cx="7467600" cy="4978400"/>
+          </a:xfrm>
+          <a:prstGeom prst="rect">
+            <a:avLst/>
+          </a:prstGeom>
+          <a:ln w="63500">
+            <a:solidFill>
+              <a:srgbClr val="0000FF"/>
+            </a:solidFill>
+          </a:ln>
+        </p:spPr>
+      </p:pic>
+      <p:pic>
+        <p:nvPicPr>
+          <p:cNvPr id="16" name="Picture 15" descr="Mcrit_vs_a_3Myrs (1).pdf"/>
+          <p:cNvPicPr>
+            <a:picLocks noChangeAspect="1"/>
+          </p:cNvPicPr>
+          <p:nvPr/>
+        </p:nvPicPr>
+        <p:blipFill>
+          <a:blip r:embed="rId19">
+            <a:extLst>
+              <a:ext uri="{28A0092B-C50C-407E-A947-70E740481C1C}">
+                <a14:useLocalDpi xmlns:a14="http://schemas.microsoft.com/office/drawing/2010/main" val="0"/>
+              </a:ext>
+            </a:extLst>
+          </a:blip>
+          <a:stretch>
+            <a:fillRect/>
+          </a:stretch>
+        </p:blipFill>
+        <p:spPr>
+          <a:xfrm>
+            <a:off x="15594806" y="31079281"/>
+            <a:ext cx="12801600" cy="5446956"/>
+          </a:xfrm>
+          <a:prstGeom prst="rect">
+            <a:avLst/>
+          </a:prstGeom>
+          <a:ln w="63500">
+            <a:solidFill>
+              <a:srgbClr val="0000FF"/>
+            </a:solidFill>
+          </a:ln>
+        </p:spPr>
+      </p:pic>
+      <p:pic>
+        <p:nvPicPr>
+          <p:cNvPr id="17" name="Picture 16" descr="Lt_profiles_v2.pdf"/>
+          <p:cNvPicPr>
+            <a:picLocks noChangeAspect="1"/>
+          </p:cNvPicPr>
+          <p:nvPr/>
+        </p:nvPicPr>
+        <p:blipFill>
+          <a:blip r:embed="rId20">
+            <a:extLst>
+              <a:ext uri="{28A0092B-C50C-407E-A947-70E740481C1C}">
+                <a14:useLocalDpi xmlns:a14="http://schemas.microsoft.com/office/drawing/2010/main" val="0"/>
+              </a:ext>
+            </a:extLst>
+          </a:blip>
+          <a:stretch>
+            <a:fillRect/>
+          </a:stretch>
+        </p:blipFill>
+        <p:spPr>
+          <a:xfrm>
+            <a:off x="2107406" y="30774481"/>
+            <a:ext cx="11963400" cy="6441831"/>
           </a:xfrm>
           <a:prstGeom prst="rect">
             <a:avLst/>

</xml_diff>

<commit_message>
repo update in progress
</commit_message>
<xml_diff>
--- a/slides/Aspen_poster_v3.pptx
+++ b/slides/Aspen_poster_v3.pptx
@@ -225,7 +225,7 @@
           <a:p>
             <a:fld id="{3359D107-6C47-E441-88A8-1AC6DD998D50}" type="datetimeFigureOut">
               <a:rPr lang="en-US" smtClean="0"/>
-              <a:t>2/7/13</a:t>
+              <a:t>5/23/13</a:t>
             </a:fld>
             <a:endParaRPr lang="en-US"/>
           </a:p>
@@ -1300,7 +1300,7 @@
               <a:pPr>
                 <a:defRPr/>
               </a:pPr>
-              <a:t>2/7/13</a:t>
+              <a:t>5/23/13</a:t>
             </a:fld>
             <a:endParaRPr lang="en-US"/>
           </a:p>
@@ -1492,7 +1492,7 @@
               <a:pPr>
                 <a:defRPr/>
               </a:pPr>
-              <a:t>2/7/13</a:t>
+              <a:t>5/23/13</a:t>
             </a:fld>
             <a:endParaRPr lang="en-US"/>
           </a:p>
@@ -1694,7 +1694,7 @@
               <a:pPr>
                 <a:defRPr/>
               </a:pPr>
-              <a:t>2/7/13</a:t>
+              <a:t>5/23/13</a:t>
             </a:fld>
             <a:endParaRPr lang="en-US"/>
           </a:p>
@@ -1886,7 +1886,7 @@
               <a:pPr>
                 <a:defRPr/>
               </a:pPr>
-              <a:t>2/7/13</a:t>
+              <a:t>5/23/13</a:t>
             </a:fld>
             <a:endParaRPr lang="en-US"/>
           </a:p>
@@ -2154,7 +2154,7 @@
               <a:pPr>
                 <a:defRPr/>
               </a:pPr>
-              <a:t>2/7/13</a:t>
+              <a:t>5/23/13</a:t>
             </a:fld>
             <a:endParaRPr lang="en-US"/>
           </a:p>
@@ -2464,7 +2464,7 @@
               <a:pPr>
                 <a:defRPr/>
               </a:pPr>
-              <a:t>2/7/13</a:t>
+              <a:t>5/23/13</a:t>
             </a:fld>
             <a:endParaRPr lang="en-US"/>
           </a:p>
@@ -2908,7 +2908,7 @@
               <a:pPr>
                 <a:defRPr/>
               </a:pPr>
-              <a:t>2/7/13</a:t>
+              <a:t>5/23/13</a:t>
             </a:fld>
             <a:endParaRPr lang="en-US"/>
           </a:p>
@@ -3048,7 +3048,7 @@
               <a:pPr>
                 <a:defRPr/>
               </a:pPr>
-              <a:t>2/7/13</a:t>
+              <a:t>5/23/13</a:t>
             </a:fld>
             <a:endParaRPr lang="en-US"/>
           </a:p>
@@ -3165,7 +3165,7 @@
               <a:pPr>
                 <a:defRPr/>
               </a:pPr>
-              <a:t>2/7/13</a:t>
+              <a:t>5/23/13</a:t>
             </a:fld>
             <a:endParaRPr lang="en-US"/>
           </a:p>
@@ -3464,7 +3464,7 @@
               <a:pPr>
                 <a:defRPr/>
               </a:pPr>
-              <a:t>2/7/13</a:t>
+              <a:t>5/23/13</a:t>
             </a:fld>
             <a:endParaRPr lang="en-US"/>
           </a:p>
@@ -3742,7 +3742,7 @@
               <a:pPr>
                 <a:defRPr/>
               </a:pPr>
-              <a:t>2/7/13</a:t>
+              <a:t>5/23/13</a:t>
             </a:fld>
             <a:endParaRPr lang="en-US"/>
           </a:p>
@@ -3998,7 +3998,7 @@
               <a:pPr>
                 <a:defRPr/>
               </a:pPr>
-              <a:t>2/7/13</a:t>
+              <a:t>5/23/13</a:t>
             </a:fld>
             <a:endParaRPr lang="en-US"/>
           </a:p>
@@ -6462,7 +6462,7 @@
               <a:graphicData uri="http://schemas.openxmlformats.org/presentationml/2006/ole">
                 <mc:AlternateContent xmlns:mc="http://schemas.openxmlformats.org/markup-compatibility/2006">
                   <mc:Choice xmlns:v="urn:schemas-microsoft-com:vml" Requires="v">
-                    <p:oleObj spid="_x0000_s1609" name="Equation" r:id="rId4" imgW="1879600" imgH="1282700" progId="Equation.3">
+                    <p:oleObj spid="_x0000_s1614" name="Equation" r:id="rId4" imgW="1879600" imgH="1282700" progId="Equation.3">
                       <p:embed/>
                     </p:oleObj>
                   </mc:Choice>
@@ -7267,7 +7267,7 @@
           <a:graphicData uri="http://schemas.openxmlformats.org/presentationml/2006/ole">
             <mc:AlternateContent xmlns:mc="http://schemas.openxmlformats.org/markup-compatibility/2006">
               <mc:Choice xmlns:v="urn:schemas-microsoft-com:vml" Requires="v">
-                <p:oleObj spid="_x0000_s1610" name="Equation" r:id="rId6" imgW="1485900" imgH="317500" progId="Equation.3">
+                <p:oleObj spid="_x0000_s1615" name="Equation" r:id="rId6" imgW="1485900" imgH="317500" progId="Equation.3">
                   <p:embed/>
                 </p:oleObj>
               </mc:Choice>
@@ -8668,7 +8668,7 @@
           <a:graphicData uri="http://schemas.openxmlformats.org/presentationml/2006/ole">
             <mc:AlternateContent xmlns:mc="http://schemas.openxmlformats.org/markup-compatibility/2006">
               <mc:Choice xmlns:v="urn:schemas-microsoft-com:vml" Requires="v">
-                <p:oleObj spid="_x0000_s1611" name="Equation" r:id="rId8" imgW="2222500" imgH="177800" progId="Equation.3">
+                <p:oleObj spid="_x0000_s1616" name="Equation" r:id="rId8" imgW="2222500" imgH="177800" progId="Equation.3">
                   <p:embed/>
                 </p:oleObj>
               </mc:Choice>
@@ -9827,7 +9827,7 @@
           <a:graphicData uri="http://schemas.openxmlformats.org/presentationml/2006/ole">
             <mc:AlternateContent xmlns:mc="http://schemas.openxmlformats.org/markup-compatibility/2006">
               <mc:Choice xmlns:v="urn:schemas-microsoft-com:vml" Requires="v">
-                <p:oleObj spid="_x0000_s1612" name="Equation" r:id="rId20" imgW="165100" imgH="152400" progId="Equation.3">
+                <p:oleObj spid="_x0000_s1617" name="Equation" r:id="rId20" imgW="165100" imgH="152400" progId="Equation.3">
                   <p:embed/>
                 </p:oleObj>
               </mc:Choice>

</xml_diff>